<commit_message>
ajout des pdf et correction de fautes
</commit_message>
<xml_diff>
--- a/P8/Presentation_projet_8.pptx
+++ b/P8/Presentation_projet_8.pptx
@@ -209,7 +209,7 @@
           <a:p>
             <a:fld id="{E66492E5-39EF-4EC5-9E99-7F0DBC26806B}" type="datetimeFigureOut">
               <a:rPr lang="fr-FR" smtClean="0"/>
-              <a:t>18/12/2017</a:t>
+              <a:t>30/01/2018</a:t>
             </a:fld>
             <a:endParaRPr lang="fr-FR"/>
           </a:p>
@@ -742,7 +742,7 @@
           <a:p>
             <a:fld id="{2A35F02A-33DF-42A4-9F54-2DFA5B84052E}" type="datetime1">
               <a:rPr lang="fr-FR" smtClean="0"/>
-              <a:t>18/12/2017</a:t>
+              <a:t>30/01/2018</a:t>
             </a:fld>
             <a:endParaRPr lang="fr-FR"/>
           </a:p>
@@ -916,7 +916,7 @@
           <a:p>
             <a:fld id="{AA7084F6-C923-4306-BC74-6AA1A26D5992}" type="datetime1">
               <a:rPr lang="fr-FR" smtClean="0"/>
-              <a:t>18/12/2017</a:t>
+              <a:t>30/01/2018</a:t>
             </a:fld>
             <a:endParaRPr lang="fr-FR"/>
           </a:p>
@@ -1100,7 +1100,7 @@
           <a:p>
             <a:fld id="{6B9DA1C8-56AA-40E0-92DC-CCF13B41CFF7}" type="datetime1">
               <a:rPr lang="fr-FR" smtClean="0"/>
-              <a:t>18/12/2017</a:t>
+              <a:t>30/01/2018</a:t>
             </a:fld>
             <a:endParaRPr lang="fr-FR"/>
           </a:p>
@@ -1274,7 +1274,7 @@
           <a:p>
             <a:fld id="{30547005-2CCE-4AAF-810C-C33FB4661996}" type="datetime1">
               <a:rPr lang="fr-FR" smtClean="0"/>
-              <a:t>18/12/2017</a:t>
+              <a:t>30/01/2018</a:t>
             </a:fld>
             <a:endParaRPr lang="fr-FR"/>
           </a:p>
@@ -1524,7 +1524,7 @@
           <a:p>
             <a:fld id="{3EBD0647-CE4F-4B82-BC14-997434234D2E}" type="datetime1">
               <a:rPr lang="fr-FR" smtClean="0"/>
-              <a:t>18/12/2017</a:t>
+              <a:t>30/01/2018</a:t>
             </a:fld>
             <a:endParaRPr lang="fr-FR"/>
           </a:p>
@@ -1816,7 +1816,7 @@
           <a:p>
             <a:fld id="{263CA1C6-1D15-44B1-8495-DE2EC5425D2F}" type="datetime1">
               <a:rPr lang="fr-FR" smtClean="0"/>
-              <a:t>18/12/2017</a:t>
+              <a:t>30/01/2018</a:t>
             </a:fld>
             <a:endParaRPr lang="fr-FR"/>
           </a:p>
@@ -2242,7 +2242,7 @@
           <a:p>
             <a:fld id="{5F86B07A-1301-4558-A6E0-D7A436826ECB}" type="datetime1">
               <a:rPr lang="fr-FR" smtClean="0"/>
-              <a:t>18/12/2017</a:t>
+              <a:t>30/01/2018</a:t>
             </a:fld>
             <a:endParaRPr lang="fr-FR"/>
           </a:p>
@@ -2364,7 +2364,7 @@
           <a:p>
             <a:fld id="{10CD6315-9A1E-41E9-BC28-33D394163B67}" type="datetime1">
               <a:rPr lang="fr-FR" smtClean="0"/>
-              <a:t>18/12/2017</a:t>
+              <a:t>30/01/2018</a:t>
             </a:fld>
             <a:endParaRPr lang="fr-FR"/>
           </a:p>
@@ -2463,7 +2463,7 @@
           <a:p>
             <a:fld id="{8EA7A85C-1960-4CA0-B72B-A39E81C20158}" type="datetime1">
               <a:rPr lang="fr-FR" smtClean="0"/>
-              <a:t>18/12/2017</a:t>
+              <a:t>30/01/2018</a:t>
             </a:fld>
             <a:endParaRPr lang="fr-FR"/>
           </a:p>
@@ -2744,7 +2744,7 @@
           <a:p>
             <a:fld id="{885A14C0-C539-4FC5-A6ED-ABABD975303B}" type="datetime1">
               <a:rPr lang="fr-FR" smtClean="0"/>
-              <a:t>18/12/2017</a:t>
+              <a:t>30/01/2018</a:t>
             </a:fld>
             <a:endParaRPr lang="fr-FR"/>
           </a:p>
@@ -3001,7 +3001,7 @@
           <a:p>
             <a:fld id="{D772F3C9-8121-4DF6-9420-FBC4A08EF57A}" type="datetime1">
               <a:rPr lang="fr-FR" smtClean="0"/>
-              <a:t>18/12/2017</a:t>
+              <a:t>30/01/2018</a:t>
             </a:fld>
             <a:endParaRPr lang="fr-FR"/>
           </a:p>
@@ -3239,7 +3239,7 @@
           <a:p>
             <a:fld id="{C13329EF-B01B-4D4B-83A1-AFBB7696C373}" type="datetime1">
               <a:rPr lang="fr-FR" smtClean="0"/>
-              <a:t>18/12/2017</a:t>
+              <a:t>30/01/2018</a:t>
             </a:fld>
             <a:endParaRPr lang="fr-FR"/>
           </a:p>
@@ -3693,25 +3693,7 @@
                 </a:solidFill>
                 <a:latin typeface="Lato" pitchFamily="34" charset="0"/>
               </a:rPr>
-              <a:t>Projet </a:t>
-            </a:r>
-            <a:r>
-              <a:rPr lang="fr-FR" dirty="0" smtClean="0">
-                <a:solidFill>
-                  <a:srgbClr val="E8750C"/>
-                </a:solidFill>
-                <a:latin typeface="Lato" pitchFamily="34" charset="0"/>
-              </a:rPr>
-              <a:t>8 </a:t>
-            </a:r>
-            <a:r>
-              <a:rPr lang="fr-FR" dirty="0" smtClean="0">
-                <a:solidFill>
-                  <a:srgbClr val="E8750C"/>
-                </a:solidFill>
-                <a:latin typeface="Lato" pitchFamily="34" charset="0"/>
-              </a:rPr>
-              <a:t>:</a:t>
+              <a:t>Projet 8 :</a:t>
             </a:r>
           </a:p>
           <a:p>
@@ -3774,7 +3756,7 @@
                   <a:srgbClr val="95023C"/>
                 </a:solidFill>
               </a:rPr>
-              <a:t>18/12/2017</a:t>
+              <a:t>30/01/2018</a:t>
             </a:fld>
             <a:endParaRPr lang="fr-FR" dirty="0">
               <a:solidFill>
@@ -4015,7 +3997,7 @@
         </p:spPr>
         <p:txBody>
           <a:bodyPr>
-            <a:normAutofit lnSpcReduction="10000"/>
+            <a:normAutofit fontScale="92500" lnSpcReduction="20000"/>
           </a:bodyPr>
           <a:lstStyle/>
           <a:p>
@@ -4078,12 +4060,20 @@
               <a:buChar char="•"/>
             </a:pPr>
             <a:r>
+              <a:rPr lang="fr-FR" dirty="0" smtClean="0">
+                <a:solidFill>
+                  <a:srgbClr val="E8750C"/>
+                </a:solidFill>
+              </a:rPr>
+              <a:t>Type </a:t>
+            </a:r>
+            <a:r>
               <a:rPr lang="fr-FR" dirty="0">
                 <a:solidFill>
                   <a:srgbClr val="E8750C"/>
                 </a:solidFill>
               </a:rPr>
-              <a:t>Type : Analyse de </a:t>
+              <a:t>: Analyse de </a:t>
             </a:r>
             <a:r>
               <a:rPr lang="fr-FR" dirty="0" smtClean="0">
@@ -4105,22 +4095,54 @@
                   <a:srgbClr val="E8750C"/>
                 </a:solidFill>
               </a:rPr>
-              <a:t>Dataset préparé (comme MNIST par exemple)</a:t>
-            </a:r>
-          </a:p>
-          <a:p>
-            <a:pPr marL="342900" lvl="1" indent="-342900">
-              <a:buFont typeface="Arial" pitchFamily="34" charset="0"/>
-              <a:buChar char="•"/>
-            </a:pPr>
+              <a:t>Contenu : 25k commentaires train + 25k test</a:t>
+            </a:r>
+          </a:p>
+          <a:p>
+            <a:pPr marL="742950" lvl="2" indent="-342900"/>
             <a:r>
               <a:rPr lang="fr-FR" dirty="0" smtClean="0">
                 <a:solidFill>
                   <a:srgbClr val="E8750C"/>
                 </a:solidFill>
               </a:rPr>
-              <a:t>25000 commentaires (50 % positifs et Négatifs)</a:t>
-            </a:r>
+              <a:t>(50 % positifs et Négatifs)</a:t>
+            </a:r>
+          </a:p>
+          <a:p>
+            <a:pPr marL="742950" lvl="2" indent="-342900"/>
+            <a:r>
+              <a:rPr lang="fr-FR" dirty="0" smtClean="0">
+                <a:solidFill>
+                  <a:srgbClr val="E8750C"/>
+                </a:solidFill>
+              </a:rPr>
+              <a:t>Longueur de la séquence à choisir</a:t>
+            </a:r>
+          </a:p>
+          <a:p>
+            <a:pPr marL="742950" lvl="2" indent="-342900"/>
+            <a:r>
+              <a:rPr lang="fr-FR" dirty="0">
+                <a:solidFill>
+                  <a:srgbClr val="E8750C"/>
+                </a:solidFill>
+              </a:rPr>
+              <a:t>Dataset </a:t>
+            </a:r>
+            <a:r>
+              <a:rPr lang="fr-FR" dirty="0" smtClean="0">
+                <a:solidFill>
+                  <a:srgbClr val="E8750C"/>
+                </a:solidFill>
+              </a:rPr>
+              <a:t>préparé</a:t>
+            </a:r>
+            <a:endParaRPr lang="fr-FR" dirty="0">
+              <a:solidFill>
+                <a:srgbClr val="E8750C"/>
+              </a:solidFill>
+            </a:endParaRPr>
           </a:p>
           <a:p>
             <a:pPr marL="342900" lvl="1" indent="-342900">
@@ -4324,7 +4346,7 @@
           <a:p>
             <a:fld id="{30547005-2CCE-4AAF-810C-C33FB4661996}" type="datetime1">
               <a:rPr lang="fr-FR" smtClean="0"/>
-              <a:t>18/12/2017</a:t>
+              <a:t>30/01/2018</a:t>
             </a:fld>
             <a:endParaRPr lang="fr-FR"/>
           </a:p>
@@ -4469,7 +4491,7 @@
           <a:p>
             <a:fld id="{30547005-2CCE-4AAF-810C-C33FB4661996}" type="datetime1">
               <a:rPr lang="fr-FR" smtClean="0"/>
-              <a:t>18/12/2017</a:t>
+              <a:t>30/01/2018</a:t>
             </a:fld>
             <a:endParaRPr lang="fr-FR"/>
           </a:p>
@@ -4665,7 +4687,7 @@
           <a:p>
             <a:fld id="{30547005-2CCE-4AAF-810C-C33FB4661996}" type="datetime1">
               <a:rPr lang="fr-FR" smtClean="0"/>
-              <a:t>18/12/2017</a:t>
+              <a:t>30/01/2018</a:t>
             </a:fld>
             <a:endParaRPr lang="fr-FR"/>
           </a:p>
@@ -4874,7 +4896,7 @@
           <a:p>
             <a:fld id="{30547005-2CCE-4AAF-810C-C33FB4661996}" type="datetime1">
               <a:rPr lang="fr-FR" smtClean="0"/>
-              <a:t>18/12/2017</a:t>
+              <a:t>30/01/2018</a:t>
             </a:fld>
             <a:endParaRPr lang="fr-FR"/>
           </a:p>
@@ -5083,7 +5105,7 @@
           <a:p>
             <a:fld id="{30547005-2CCE-4AAF-810C-C33FB4661996}" type="datetime1">
               <a:rPr lang="fr-FR" smtClean="0"/>
-              <a:t>18/12/2017</a:t>
+              <a:t>30/01/2018</a:t>
             </a:fld>
             <a:endParaRPr lang="fr-FR"/>
           </a:p>
@@ -5292,7 +5314,7 @@
           <a:p>
             <a:fld id="{30547005-2CCE-4AAF-810C-C33FB4661996}" type="datetime1">
               <a:rPr lang="fr-FR" smtClean="0"/>
-              <a:t>18/12/2017</a:t>
+              <a:t>30/01/2018</a:t>
             </a:fld>
             <a:endParaRPr lang="fr-FR"/>
           </a:p>
@@ -5498,31 +5520,34 @@
                   <a:srgbClr val="E8750C"/>
                 </a:solidFill>
               </a:rPr>
-              <a:t>L² </a:t>
-            </a:r>
+              <a:t>Régularisations</a:t>
+            </a:r>
+          </a:p>
+          <a:p>
+            <a:pPr marL="1200150" lvl="3" indent="-342900"/>
             <a:r>
               <a:rPr lang="fr-FR" dirty="0" err="1" smtClean="0">
                 <a:solidFill>
                   <a:srgbClr val="E8750C"/>
                 </a:solidFill>
               </a:rPr>
-              <a:t>regularisation</a:t>
-            </a:r>
-            <a:endParaRPr lang="fr-FR" dirty="0" smtClean="0">
-              <a:solidFill>
-                <a:srgbClr val="E8750C"/>
-              </a:solidFill>
-            </a:endParaRPr>
-          </a:p>
-          <a:p>
-            <a:pPr marL="1200150" lvl="3" indent="-342900"/>
+              <a:t>Stride</a:t>
+            </a:r>
+            <a:r>
+              <a:rPr lang="fr-FR" dirty="0" smtClean="0">
+                <a:solidFill>
+                  <a:srgbClr val="E8750C"/>
+                </a:solidFill>
+              </a:rPr>
+              <a:t>/</a:t>
+            </a:r>
             <a:r>
               <a:rPr lang="fr-FR" dirty="0" err="1" smtClean="0">
                 <a:solidFill>
                   <a:srgbClr val="E8750C"/>
                 </a:solidFill>
               </a:rPr>
-              <a:t>Stride</a:t>
+              <a:t>Kernel</a:t>
             </a:r>
             <a:endParaRPr lang="fr-FR" dirty="0" smtClean="0">
               <a:solidFill>
@@ -5715,7 +5740,7 @@
           <a:p>
             <a:fld id="{30547005-2CCE-4AAF-810C-C33FB4661996}" type="datetime1">
               <a:rPr lang="fr-FR" smtClean="0"/>
-              <a:t>18/12/2017</a:t>
+              <a:t>30/01/2018</a:t>
             </a:fld>
             <a:endParaRPr lang="fr-FR"/>
           </a:p>
@@ -5922,7 +5947,7 @@
                   <a:srgbClr val="E8750C"/>
                 </a:solidFill>
               </a:rPr>
-              <a:t>30 ans de flottements</a:t>
+              <a:t>Champ d’application très large</a:t>
             </a:r>
           </a:p>
           <a:p>
@@ -5931,12 +5956,20 @@
               <a:buChar char="•"/>
             </a:pPr>
             <a:r>
+              <a:rPr lang="fr-FR" dirty="0">
+                <a:solidFill>
+                  <a:srgbClr val="E8750C"/>
+                </a:solidFill>
+              </a:rPr>
+              <a:t>Très démocratisé (traduction, Analyse de sentiments, classification</a:t>
+            </a:r>
+            <a:r>
               <a:rPr lang="fr-FR" dirty="0" smtClean="0">
                 <a:solidFill>
                   <a:srgbClr val="E8750C"/>
                 </a:solidFill>
               </a:rPr>
-              <a:t>Très démocratisé (traduction, Analyse de sentiments, classification)</a:t>
+              <a:t>)</a:t>
             </a:r>
           </a:p>
           <a:p>
@@ -5950,23 +5983,7 @@
                   <a:srgbClr val="E8750C"/>
                 </a:solidFill>
               </a:rPr>
-              <a:t>Encore limite (musique : </a:t>
-            </a:r>
-            <a:r>
-              <a:rPr lang="fr-FR" dirty="0" err="1" smtClean="0">
-                <a:solidFill>
-                  <a:srgbClr val="E8750C"/>
-                </a:solidFill>
-              </a:rPr>
-              <a:t>GANs</a:t>
-            </a:r>
-            <a:r>
-              <a:rPr lang="fr-FR" dirty="0" smtClean="0">
-                <a:solidFill>
-                  <a:srgbClr val="E8750C"/>
-                </a:solidFill>
-              </a:rPr>
-              <a:t>)</a:t>
+              <a:t>30 ans de flottements</a:t>
             </a:r>
           </a:p>
           <a:p>
@@ -5980,7 +5997,23 @@
                   <a:srgbClr val="E8750C"/>
                 </a:solidFill>
               </a:rPr>
-              <a:t>LSTM très majoritaire</a:t>
+              <a:t>Encore limite (musique : </a:t>
+            </a:r>
+            <a:r>
+              <a:rPr lang="fr-FR" dirty="0" err="1" smtClean="0">
+                <a:solidFill>
+                  <a:srgbClr val="E8750C"/>
+                </a:solidFill>
+              </a:rPr>
+              <a:t>GANs</a:t>
+            </a:r>
+            <a:r>
+              <a:rPr lang="fr-FR" dirty="0" smtClean="0">
+                <a:solidFill>
+                  <a:srgbClr val="E8750C"/>
+                </a:solidFill>
+              </a:rPr>
+              <a:t>)</a:t>
             </a:r>
           </a:p>
           <a:p>
@@ -5994,7 +6027,59 @@
                   <a:srgbClr val="E8750C"/>
                 </a:solidFill>
               </a:rPr>
-              <a:t>QRNN encore un peu jeune mais prometteur</a:t>
+              <a:t>LSTM très majoritaire</a:t>
+            </a:r>
+          </a:p>
+          <a:p>
+            <a:pPr marL="457200" lvl="1" indent="-457200">
+              <a:buFont typeface="Arial" pitchFamily="34" charset="0"/>
+              <a:buChar char="•"/>
+            </a:pPr>
+            <a:r>
+              <a:rPr lang="fr-FR" dirty="0" smtClean="0">
+                <a:solidFill>
+                  <a:srgbClr val="E8750C"/>
+                </a:solidFill>
+              </a:rPr>
+              <a:t>QRNN encore un peu jeune mais </a:t>
+            </a:r>
+            <a:r>
+              <a:rPr lang="fr-FR" dirty="0" smtClean="0">
+                <a:solidFill>
+                  <a:srgbClr val="E8750C"/>
+                </a:solidFill>
+              </a:rPr>
+              <a:t>prometteur</a:t>
+            </a:r>
+          </a:p>
+          <a:p>
+            <a:pPr marL="457200" lvl="1" indent="-457200">
+              <a:buFont typeface="Arial" pitchFamily="34" charset="0"/>
+              <a:buChar char="•"/>
+            </a:pPr>
+            <a:r>
+              <a:rPr lang="fr-FR" dirty="0" smtClean="0">
+                <a:solidFill>
+                  <a:srgbClr val="E8750C"/>
+                </a:solidFill>
+              </a:rPr>
+              <a:t>Le </a:t>
+            </a:r>
+            <a:r>
+              <a:rPr lang="fr-FR" dirty="0" err="1" smtClean="0">
+                <a:solidFill>
+                  <a:srgbClr val="E8750C"/>
+                </a:solidFill>
+              </a:rPr>
+              <a:t>sythetic</a:t>
+            </a:r>
+            <a:r>
+              <a:rPr lang="fr-FR" dirty="0" smtClean="0">
+                <a:solidFill>
+                  <a:srgbClr val="E8750C"/>
+                </a:solidFill>
+              </a:rPr>
+              <a:t> gradient : novateur contre BPTT ?</a:t>
             </a:r>
             <a:endParaRPr lang="fr-FR" dirty="0">
               <a:solidFill>
@@ -6028,7 +6113,7 @@
           <a:p>
             <a:fld id="{30547005-2CCE-4AAF-810C-C33FB4661996}" type="datetime1">
               <a:rPr lang="fr-FR" smtClean="0"/>
-              <a:t>18/12/2017</a:t>
+              <a:t>30/01/2018</a:t>
             </a:fld>
             <a:endParaRPr lang="fr-FR"/>
           </a:p>
@@ -6111,7 +6196,7 @@
           <a:p>
             <a:fld id="{30547005-2CCE-4AAF-810C-C33FB4661996}" type="datetime1">
               <a:rPr lang="fr-FR" smtClean="0"/>
-              <a:t>18/12/2017</a:t>
+              <a:t>30/01/2018</a:t>
             </a:fld>
             <a:endParaRPr lang="fr-FR"/>
           </a:p>
@@ -6392,7 +6477,7 @@
           <a:p>
             <a:fld id="{30547005-2CCE-4AAF-810C-C33FB4661996}" type="datetime1">
               <a:rPr lang="fr-FR" smtClean="0"/>
-              <a:t>18/12/2017</a:t>
+              <a:t>30/01/2018</a:t>
             </a:fld>
             <a:endParaRPr lang="fr-FR"/>
           </a:p>
@@ -6539,7 +6624,7 @@
         </p:spPr>
         <p:txBody>
           <a:bodyPr>
-            <a:normAutofit/>
+            <a:normAutofit fontScale="92500" lnSpcReduction="20000"/>
           </a:bodyPr>
           <a:lstStyle/>
           <a:p>
@@ -6549,15 +6634,18 @@
                   <a:srgbClr val="E8750C"/>
                 </a:solidFill>
               </a:rPr>
-              <a:t>Sortie</a:t>
-            </a:r>
+              <a:t>Prédictions sur des données temporelles</a:t>
+            </a:r>
+          </a:p>
+          <a:p>
+            <a:pPr lvl="1"/>
             <a:r>
               <a:rPr lang="fr-FR" dirty="0" smtClean="0">
                 <a:solidFill>
                   <a:srgbClr val="E8750C"/>
                 </a:solidFill>
               </a:rPr>
-              <a:t> récurrente</a:t>
+              <a:t>Sorties récurrentes</a:t>
             </a:r>
           </a:p>
           <a:p>
@@ -6571,12 +6659,56 @@
             </a:r>
           </a:p>
           <a:p>
+            <a:pPr lvl="1"/>
             <a:r>
               <a:rPr lang="fr-FR" dirty="0" smtClean="0">
                 <a:solidFill>
                   <a:srgbClr val="E8750C"/>
                 </a:solidFill>
               </a:rPr>
+              <a:t>Retards</a:t>
+            </a:r>
+          </a:p>
+          <a:p>
+            <a:pPr lvl="1"/>
+            <a:r>
+              <a:rPr lang="fr-FR" dirty="0" smtClean="0">
+                <a:solidFill>
+                  <a:srgbClr val="E8750C"/>
+                </a:solidFill>
+              </a:rPr>
+              <a:t>analyse de texte</a:t>
+            </a:r>
+          </a:p>
+          <a:p>
+            <a:pPr lvl="1"/>
+            <a:r>
+              <a:rPr lang="fr-FR" dirty="0" smtClean="0">
+                <a:solidFill>
+                  <a:srgbClr val="E8750C"/>
+                </a:solidFill>
+              </a:rPr>
+              <a:t>Traduction</a:t>
+            </a:r>
+          </a:p>
+          <a:p>
+            <a:pPr lvl="1"/>
+            <a:r>
+              <a:rPr lang="fr-FR" dirty="0" smtClean="0">
+                <a:solidFill>
+                  <a:srgbClr val="E8750C"/>
+                </a:solidFill>
+              </a:rPr>
+              <a:t>…</a:t>
+            </a:r>
+          </a:p>
+          <a:p>
+            <a:r>
+              <a:rPr lang="fr-FR" dirty="0" smtClean="0">
+                <a:solidFill>
+                  <a:srgbClr val="E8750C"/>
+                </a:solidFill>
+              </a:rPr>
               <a:t>Back propagation différente</a:t>
             </a:r>
           </a:p>
@@ -6588,15 +6720,28 @@
                   <a:srgbClr val="E8750C"/>
                 </a:solidFill>
               </a:rPr>
-              <a:t>BP </a:t>
-            </a:r>
+              <a:t>BP dans le temps et l’espace</a:t>
+            </a:r>
+          </a:p>
+          <a:p>
+            <a:r>
+              <a:rPr lang="fr-FR" dirty="0" smtClean="0">
+                <a:solidFill>
+                  <a:srgbClr val="E8750C"/>
+                </a:solidFill>
+              </a:rPr>
+              <a:t>Problème</a:t>
+            </a:r>
+          </a:p>
+          <a:p>
+            <a:pPr lvl="1"/>
             <a:r>
               <a:rPr lang="fr-FR" dirty="0" err="1" smtClean="0">
                 <a:solidFill>
                   <a:srgbClr val="E8750C"/>
                 </a:solidFill>
               </a:rPr>
-              <a:t>through</a:t>
+              <a:t>Vanishing</a:t>
             </a:r>
             <a:r>
               <a:rPr lang="fr-FR" dirty="0" smtClean="0">
@@ -6604,43 +6749,6 @@
                   <a:srgbClr val="E8750C"/>
                 </a:solidFill>
               </a:rPr>
-              <a:t> time</a:t>
-            </a:r>
-          </a:p>
-          <a:p>
-            <a:pPr lvl="1"/>
-            <a:endParaRPr lang="fr-FR" dirty="0" smtClean="0">
-              <a:solidFill>
-                <a:srgbClr val="E8750C"/>
-              </a:solidFill>
-            </a:endParaRPr>
-          </a:p>
-          <a:p>
-            <a:r>
-              <a:rPr lang="fr-FR" dirty="0" smtClean="0">
-                <a:solidFill>
-                  <a:srgbClr val="E8750C"/>
-                </a:solidFill>
-              </a:rPr>
-              <a:t>Problème</a:t>
-            </a:r>
-          </a:p>
-          <a:p>
-            <a:pPr lvl="1"/>
-            <a:r>
-              <a:rPr lang="fr-FR" dirty="0" err="1" smtClean="0">
-                <a:solidFill>
-                  <a:srgbClr val="E8750C"/>
-                </a:solidFill>
-              </a:rPr>
-              <a:t>Vanishing</a:t>
-            </a:r>
-            <a:r>
-              <a:rPr lang="fr-FR" dirty="0" smtClean="0">
-                <a:solidFill>
-                  <a:srgbClr val="E8750C"/>
-                </a:solidFill>
-              </a:rPr>
               <a:t> Gradient</a:t>
             </a:r>
           </a:p>
@@ -6663,7 +6771,7 @@
           <a:p>
             <a:fld id="{30547005-2CCE-4AAF-810C-C33FB4661996}" type="datetime1">
               <a:rPr lang="fr-FR" smtClean="0"/>
-              <a:t>18/12/2017</a:t>
+              <a:t>30/01/2018</a:t>
             </a:fld>
             <a:endParaRPr lang="fr-FR"/>
           </a:p>
@@ -6717,7 +6825,7 @@
         </p:blipFill>
         <p:spPr>
           <a:xfrm>
-            <a:off x="5292080" y="4149080"/>
+            <a:off x="5436096" y="4149080"/>
             <a:ext cx="3594477" cy="2158360"/>
           </a:xfrm>
           <a:prstGeom prst="rect">
@@ -6727,8 +6835,10 @@
       </p:pic>
       <p:pic>
         <p:nvPicPr>
-          <p:cNvPr id="8" name="Image 7"/>
-          <p:cNvPicPr/>
+          <p:cNvPr id="1026" name="Picture 2" descr="Résultat de recherche d'images pour &quot;unfold RNN&quot;"/>
+          <p:cNvPicPr>
+            <a:picLocks noChangeAspect="1" noChangeArrowheads="1"/>
+          </p:cNvPicPr>
           <p:nvPr/>
         </p:nvPicPr>
         <p:blipFill>
@@ -6749,18 +6859,29 @@
               </a:ext>
             </a:extLst>
           </a:blip>
+          <a:srcRect/>
           <a:stretch>
             <a:fillRect/>
           </a:stretch>
         </p:blipFill>
-        <p:spPr>
+        <p:spPr bwMode="auto">
           <a:xfrm>
-            <a:off x="5652120" y="1564680"/>
-            <a:ext cx="3366120" cy="2088232"/>
+            <a:off x="4788024" y="2204864"/>
+            <a:ext cx="4104456" cy="1646946"/>
           </a:xfrm>
           <a:prstGeom prst="rect">
             <a:avLst/>
           </a:prstGeom>
+          <a:noFill/>
+          <a:extLst>
+            <a:ext uri="{909E8E84-426E-40DD-AFC4-6F175D3DCCD1}">
+              <a14:hiddenFill xmlns:a14="http://schemas.microsoft.com/office/drawing/2010/main">
+                <a:solidFill>
+                  <a:srgbClr val="FFFFFF"/>
+                </a:solidFill>
+              </a14:hiddenFill>
+            </a:ext>
+          </a:extLst>
         </p:spPr>
       </p:pic>
     </p:spTree>
@@ -6819,7 +6940,6 @@
               <a:rPr lang="fr-FR" dirty="0"/>
               <a:t>Principe du RNN</a:t>
             </a:r>
-            <a:endParaRPr lang="fr-FR" dirty="0"/>
           </a:p>
         </p:txBody>
       </p:sp>
@@ -6917,7 +7037,7 @@
           <a:p>
             <a:fld id="{30547005-2CCE-4AAF-810C-C33FB4661996}" type="datetime1">
               <a:rPr lang="fr-FR" smtClean="0"/>
-              <a:t>18/12/2017</a:t>
+              <a:t>30/01/2018</a:t>
             </a:fld>
             <a:endParaRPr lang="fr-FR"/>
           </a:p>
@@ -7049,8 +7169,8 @@
           </a:p>
         </p:txBody>
       </p:sp>
-      <mc:AlternateContent xmlns:mc="http://schemas.openxmlformats.org/markup-compatibility/2006">
-        <mc:Choice xmlns:a14="http://schemas.microsoft.com/office/drawing/2010/main" Requires="a14">
+      <mc:AlternateContent xmlns:mc="http://schemas.openxmlformats.org/markup-compatibility/2006" xmlns:a14="http://schemas.microsoft.com/office/drawing/2010/main">
+        <mc:Choice Requires="a14">
           <p:sp>
             <p:nvSpPr>
               <p:cNvPr id="3" name="Espace réservé du contenu 2"/>
@@ -7162,6 +7282,7 @@
                         <a:solidFill>
                           <a:srgbClr val="FF0000"/>
                         </a:solidFill>
+                        <a:latin typeface="Cambria Math"/>
                       </a:rPr>
                       <m:t>𝑆</m:t>
                     </m:r>
@@ -7170,6 +7291,7 @@
                         <a:solidFill>
                           <a:srgbClr val="FF0000"/>
                         </a:solidFill>
+                        <a:latin typeface="Cambria Math"/>
                       </a:rPr>
                       <m:t>(</m:t>
                     </m:r>
@@ -7178,6 +7300,7 @@
                         <a:solidFill>
                           <a:srgbClr val="FF0000"/>
                         </a:solidFill>
+                        <a:latin typeface="Cambria Math"/>
                       </a:rPr>
                       <m:t>𝑡</m:t>
                     </m:r>
@@ -7186,6 +7309,7 @@
                         <a:solidFill>
                           <a:srgbClr val="FF0000"/>
                         </a:solidFill>
+                        <a:latin typeface="Cambria Math"/>
                       </a:rPr>
                       <m:t>)=</m:t>
                     </m:r>
@@ -7194,6 +7318,7 @@
                         <a:solidFill>
                           <a:srgbClr val="FF0000"/>
                         </a:solidFill>
+                        <a:latin typeface="Cambria Math"/>
                       </a:rPr>
                       <m:t>𝑓</m:t>
                     </m:r>
@@ -7204,6 +7329,7 @@
                             <a:solidFill>
                               <a:srgbClr val="FF0000"/>
                             </a:solidFill>
+                            <a:latin typeface="Cambria Math"/>
                           </a:rPr>
                         </m:ctrlPr>
                       </m:dPr>
@@ -7218,6 +7344,7 @@
                                 <a:solidFill>
                                   <a:srgbClr val="FF0000"/>
                                 </a:solidFill>
+                                <a:latin typeface="Cambria Math"/>
                               </a:rPr>
                             </m:ctrlPr>
                           </m:naryPr>
@@ -7227,6 +7354,7 @@
                                 <a:solidFill>
                                   <a:srgbClr val="FF0000"/>
                                 </a:solidFill>
+                                <a:latin typeface="Cambria Math"/>
                               </a:rPr>
                               <m:t>𝑖𝑛𝑝𝑢𝑡𝑠</m:t>
                             </m:r>
@@ -7240,6 +7368,7 @@
                                     <a:solidFill>
                                       <a:srgbClr val="FF0000"/>
                                     </a:solidFill>
+                                    <a:latin typeface="Cambria Math"/>
                                   </a:rPr>
                                 </m:ctrlPr>
                               </m:sSubPr>
@@ -7249,6 +7378,7 @@
                                     <a:solidFill>
                                       <a:srgbClr val="FF0000"/>
                                     </a:solidFill>
+                                    <a:latin typeface="Cambria Math"/>
                                   </a:rPr>
                                   <m:t>𝑎</m:t>
                                 </m:r>
@@ -7259,6 +7389,7 @@
                                     <a:solidFill>
                                       <a:srgbClr val="FF0000"/>
                                     </a:solidFill>
+                                    <a:latin typeface="Cambria Math"/>
                                   </a:rPr>
                                   <m:t>𝑖</m:t>
                                 </m:r>
@@ -7269,6 +7400,7 @@
                                 <a:solidFill>
                                   <a:srgbClr val="FF0000"/>
                                 </a:solidFill>
+                                <a:latin typeface="Cambria Math"/>
                               </a:rPr>
                               <m:t>∗</m:t>
                             </m:r>
@@ -7279,6 +7411,7 @@
                                     <a:solidFill>
                                       <a:srgbClr val="FF0000"/>
                                     </a:solidFill>
+                                    <a:latin typeface="Cambria Math"/>
                                   </a:rPr>
                                 </m:ctrlPr>
                               </m:sSubPr>
@@ -7288,6 +7421,7 @@
                                     <a:solidFill>
                                       <a:srgbClr val="FF0000"/>
                                     </a:solidFill>
+                                    <a:latin typeface="Cambria Math"/>
                                   </a:rPr>
                                   <m:t>𝑥</m:t>
                                 </m:r>
@@ -7298,6 +7432,7 @@
                                     <a:solidFill>
                                       <a:srgbClr val="FF0000"/>
                                     </a:solidFill>
+                                    <a:latin typeface="Cambria Math"/>
                                   </a:rPr>
                                   <m:t>𝑖</m:t>
                                 </m:r>
@@ -7308,6 +7443,7 @@
                                 <a:solidFill>
                                   <a:srgbClr val="FF0000"/>
                                 </a:solidFill>
+                                <a:latin typeface="Cambria Math"/>
                               </a:rPr>
                               <m:t>(</m:t>
                             </m:r>
@@ -7316,6 +7452,7 @@
                                 <a:solidFill>
                                   <a:srgbClr val="FF0000"/>
                                 </a:solidFill>
+                                <a:latin typeface="Cambria Math"/>
                               </a:rPr>
                               <m:t>𝑡</m:t>
                             </m:r>
@@ -7324,6 +7461,7 @@
                                 <a:solidFill>
                                   <a:srgbClr val="FF0000"/>
                                 </a:solidFill>
+                                <a:latin typeface="Cambria Math"/>
                               </a:rPr>
                               <m:t>)</m:t>
                             </m:r>
@@ -7334,6 +7472,7 @@
                             <a:solidFill>
                               <a:srgbClr val="FF0000"/>
                             </a:solidFill>
+                            <a:latin typeface="Cambria Math"/>
                           </a:rPr>
                           <m:t>+</m:t>
                         </m:r>
@@ -7342,6 +7481,7 @@
                             <a:solidFill>
                               <a:srgbClr val="FF0000"/>
                             </a:solidFill>
+                            <a:latin typeface="Cambria Math"/>
                           </a:rPr>
                           <m:t>h</m:t>
                         </m:r>
@@ -7352,6 +7492,7 @@
                                 <a:solidFill>
                                   <a:srgbClr val="FF0000"/>
                                 </a:solidFill>
+                                <a:latin typeface="Cambria Math"/>
                               </a:rPr>
                             </m:ctrlPr>
                           </m:dPr>
@@ -7366,6 +7507,7 @@
                                     <a:solidFill>
                                       <a:srgbClr val="FF0000"/>
                                     </a:solidFill>
+                                    <a:latin typeface="Cambria Math"/>
                                   </a:rPr>
                                 </m:ctrlPr>
                               </m:naryPr>
@@ -7375,6 +7517,7 @@
                                     <a:solidFill>
                                       <a:srgbClr val="FF0000"/>
                                     </a:solidFill>
+                                    <a:latin typeface="Cambria Math"/>
                                   </a:rPr>
                                   <m:t>𝑖𝑛𝑝𝑢𝑡𝑠</m:t>
                                 </m:r>
@@ -7388,6 +7531,7 @@
                                         <a:solidFill>
                                           <a:srgbClr val="FF0000"/>
                                         </a:solidFill>
+                                        <a:latin typeface="Cambria Math"/>
                                       </a:rPr>
                                     </m:ctrlPr>
                                   </m:sSubPr>
@@ -7397,6 +7541,7 @@
                                         <a:solidFill>
                                           <a:srgbClr val="FF0000"/>
                                         </a:solidFill>
+                                        <a:latin typeface="Cambria Math"/>
                                       </a:rPr>
                                       <m:t>𝑎</m:t>
                                     </m:r>
@@ -7407,6 +7552,7 @@
                                         <a:solidFill>
                                           <a:srgbClr val="FF0000"/>
                                         </a:solidFill>
+                                        <a:latin typeface="Cambria Math"/>
                                       </a:rPr>
                                       <m:t>𝑖</m:t>
                                     </m:r>
@@ -7417,6 +7563,7 @@
                                     <a:solidFill>
                                       <a:srgbClr val="FF0000"/>
                                     </a:solidFill>
+                                    <a:latin typeface="Cambria Math"/>
                                   </a:rPr>
                                   <m:t>∗</m:t>
                                 </m:r>
@@ -7427,6 +7574,7 @@
                                         <a:solidFill>
                                           <a:srgbClr val="FF0000"/>
                                         </a:solidFill>
+                                        <a:latin typeface="Cambria Math"/>
                                       </a:rPr>
                                     </m:ctrlPr>
                                   </m:sSubPr>
@@ -7436,6 +7584,7 @@
                                         <a:solidFill>
                                           <a:srgbClr val="FF0000"/>
                                         </a:solidFill>
+                                        <a:latin typeface="Cambria Math"/>
                                       </a:rPr>
                                       <m:t>𝑥</m:t>
                                     </m:r>
@@ -7446,6 +7595,7 @@
                                         <a:solidFill>
                                           <a:srgbClr val="FF0000"/>
                                         </a:solidFill>
+                                        <a:latin typeface="Cambria Math"/>
                                       </a:rPr>
                                       <m:t>𝑖</m:t>
                                     </m:r>
@@ -7456,6 +7606,7 @@
                                     <a:solidFill>
                                       <a:srgbClr val="FF0000"/>
                                     </a:solidFill>
+                                    <a:latin typeface="Cambria Math"/>
                                   </a:rPr>
                                   <m:t>(</m:t>
                                 </m:r>
@@ -7464,6 +7615,7 @@
                                     <a:solidFill>
                                       <a:srgbClr val="FF0000"/>
                                     </a:solidFill>
+                                    <a:latin typeface="Cambria Math"/>
                                   </a:rPr>
                                   <m:t>𝑡</m:t>
                                 </m:r>
@@ -7472,6 +7624,7 @@
                                     <a:solidFill>
                                       <a:srgbClr val="FF0000"/>
                                     </a:solidFill>
+                                    <a:latin typeface="Cambria Math"/>
                                   </a:rPr>
                                   <m:t>−1)</m:t>
                                 </m:r>
@@ -7493,6 +7646,7 @@
                         <a:solidFill>
                           <a:srgbClr val="00B050"/>
                         </a:solidFill>
+                        <a:latin typeface="Cambria Math"/>
                       </a:rPr>
                       <m:t>𝑆</m:t>
                     </m:r>
@@ -7501,6 +7655,7 @@
                         <a:solidFill>
                           <a:srgbClr val="00B050"/>
                         </a:solidFill>
+                        <a:latin typeface="Cambria Math"/>
                       </a:rPr>
                       <m:t>(</m:t>
                     </m:r>
@@ -7509,6 +7664,7 @@
                         <a:solidFill>
                           <a:srgbClr val="00B050"/>
                         </a:solidFill>
+                        <a:latin typeface="Cambria Math"/>
                       </a:rPr>
                       <m:t>𝑡</m:t>
                     </m:r>
@@ -7517,6 +7673,7 @@
                         <a:solidFill>
                           <a:srgbClr val="00B050"/>
                         </a:solidFill>
+                        <a:latin typeface="Cambria Math"/>
                       </a:rPr>
                       <m:t>)=</m:t>
                     </m:r>
@@ -7525,6 +7682,7 @@
                         <a:solidFill>
                           <a:srgbClr val="00B050"/>
                         </a:solidFill>
+                        <a:latin typeface="Cambria Math"/>
                       </a:rPr>
                       <m:t>𝑓</m:t>
                     </m:r>
@@ -7535,6 +7693,7 @@
                             <a:solidFill>
                               <a:srgbClr val="00B050"/>
                             </a:solidFill>
+                            <a:latin typeface="Cambria Math"/>
                           </a:rPr>
                         </m:ctrlPr>
                       </m:dPr>
@@ -7549,6 +7708,7 @@
                                 <a:solidFill>
                                   <a:srgbClr val="00B050"/>
                                 </a:solidFill>
+                                <a:latin typeface="Cambria Math"/>
                               </a:rPr>
                             </m:ctrlPr>
                           </m:naryPr>
@@ -7558,6 +7718,7 @@
                                 <a:solidFill>
                                   <a:srgbClr val="00B050"/>
                                 </a:solidFill>
+                                <a:latin typeface="Cambria Math"/>
                               </a:rPr>
                               <m:t>𝑖𝑛𝑝𝑢𝑡𝑠</m:t>
                             </m:r>
@@ -7571,6 +7732,7 @@
                                     <a:solidFill>
                                       <a:srgbClr val="00B050"/>
                                     </a:solidFill>
+                                    <a:latin typeface="Cambria Math"/>
                                   </a:rPr>
                                 </m:ctrlPr>
                               </m:sSubPr>
@@ -7580,6 +7742,7 @@
                                     <a:solidFill>
                                       <a:srgbClr val="00B050"/>
                                     </a:solidFill>
+                                    <a:latin typeface="Cambria Math"/>
                                   </a:rPr>
                                   <m:t>𝑎</m:t>
                                 </m:r>
@@ -7590,6 +7753,7 @@
                                     <a:solidFill>
                                       <a:srgbClr val="00B050"/>
                                     </a:solidFill>
+                                    <a:latin typeface="Cambria Math"/>
                                   </a:rPr>
                                   <m:t>𝑖</m:t>
                                 </m:r>
@@ -7600,6 +7764,7 @@
                                 <a:solidFill>
                                   <a:srgbClr val="00B050"/>
                                 </a:solidFill>
+                                <a:latin typeface="Cambria Math"/>
                               </a:rPr>
                               <m:t>∗</m:t>
                             </m:r>
@@ -7610,6 +7775,7 @@
                                     <a:solidFill>
                                       <a:srgbClr val="00B050"/>
                                     </a:solidFill>
+                                    <a:latin typeface="Cambria Math"/>
                                   </a:rPr>
                                 </m:ctrlPr>
                               </m:sSubPr>
@@ -7619,6 +7785,7 @@
                                     <a:solidFill>
                                       <a:srgbClr val="00B050"/>
                                     </a:solidFill>
+                                    <a:latin typeface="Cambria Math"/>
                                   </a:rPr>
                                   <m:t>𝑥</m:t>
                                 </m:r>
@@ -7629,6 +7796,7 @@
                                     <a:solidFill>
                                       <a:srgbClr val="00B050"/>
                                     </a:solidFill>
+                                    <a:latin typeface="Cambria Math"/>
                                   </a:rPr>
                                   <m:t>𝑖</m:t>
                                 </m:r>
@@ -7641,6 +7809,7 @@
                             <a:solidFill>
                               <a:srgbClr val="00B050"/>
                             </a:solidFill>
+                            <a:latin typeface="Cambria Math"/>
                           </a:rPr>
                           <m:t>+</m:t>
                         </m:r>
@@ -7649,6 +7818,7 @@
                             <a:solidFill>
                               <a:srgbClr val="00B050"/>
                             </a:solidFill>
+                            <a:latin typeface="Cambria Math"/>
                           </a:rPr>
                           <m:t>𝑏</m:t>
                         </m:r>
@@ -7657,6 +7827,7 @@
                             <a:solidFill>
                               <a:srgbClr val="00B050"/>
                             </a:solidFill>
+                            <a:latin typeface="Cambria Math"/>
                           </a:rPr>
                           <m:t>2∗</m:t>
                         </m:r>
@@ -7667,6 +7838,7 @@
                                 <a:solidFill>
                                   <a:srgbClr val="00B050"/>
                                 </a:solidFill>
+                                <a:latin typeface="Cambria Math"/>
                               </a:rPr>
                             </m:ctrlPr>
                           </m:dPr>
@@ -7676,6 +7848,7 @@
                                 <a:solidFill>
                                   <a:srgbClr val="00B050"/>
                                 </a:solidFill>
+                                <a:latin typeface="Cambria Math"/>
                               </a:rPr>
                               <m:t>𝑆</m:t>
                             </m:r>
@@ -7684,6 +7857,7 @@
                                 <a:solidFill>
                                   <a:srgbClr val="00B050"/>
                                 </a:solidFill>
+                                <a:latin typeface="Cambria Math"/>
                               </a:rPr>
                               <m:t>(</m:t>
                             </m:r>
@@ -7692,6 +7866,7 @@
                                 <a:solidFill>
                                   <a:srgbClr val="00B050"/>
                                 </a:solidFill>
+                                <a:latin typeface="Cambria Math"/>
                               </a:rPr>
                               <m:t>𝑡</m:t>
                             </m:r>
@@ -7700,6 +7875,7 @@
                                 <a:solidFill>
                                   <a:srgbClr val="00B050"/>
                                 </a:solidFill>
+                                <a:latin typeface="Cambria Math"/>
                               </a:rPr>
                               <m:t>−1)</m:t>
                             </m:r>
@@ -7724,7 +7900,7 @@
             </p:txBody>
           </p:sp>
         </mc:Choice>
-        <mc:Fallback>
+        <mc:Fallback xmlns="">
           <p:sp>
             <p:nvSpPr>
               <p:cNvPr id="3" name="Espace réservé du contenu 2"/>
@@ -7779,7 +7955,7 @@
           <a:p>
             <a:fld id="{30547005-2CCE-4AAF-810C-C33FB4661996}" type="datetime1">
               <a:rPr lang="fr-FR" smtClean="0"/>
-              <a:t>18/12/2017</a:t>
+              <a:t>30/01/2018</a:t>
             </a:fld>
             <a:endParaRPr lang="fr-FR"/>
           </a:p>
@@ -7929,7 +8105,7 @@
         </p:spPr>
         <p:txBody>
           <a:bodyPr>
-            <a:normAutofit/>
+            <a:normAutofit lnSpcReduction="10000"/>
           </a:bodyPr>
           <a:lstStyle/>
           <a:p>
@@ -7945,11 +8121,6 @@
               </a:rPr>
               <a:t>LSTM 1997</a:t>
             </a:r>
-            <a:endParaRPr lang="fr-FR" sz="2400" dirty="0" smtClean="0">
-              <a:solidFill>
-                <a:srgbClr val="E8750C"/>
-              </a:solidFill>
-            </a:endParaRPr>
           </a:p>
           <a:p>
             <a:pPr lvl="1"/>
@@ -8084,7 +8255,7 @@
                   <a:srgbClr val="E8750C"/>
                 </a:solidFill>
               </a:rPr>
-              <a:t>Performance très haute</a:t>
+              <a:t>Performances très hautes</a:t>
             </a:r>
           </a:p>
           <a:p>
@@ -8096,11 +8267,16 @@
               </a:rPr>
               <a:t>Gourmant en calcul</a:t>
             </a:r>
-            <a:endParaRPr lang="fr-FR" sz="2400" dirty="0" smtClean="0">
-              <a:solidFill>
-                <a:srgbClr val="E8750C"/>
-              </a:solidFill>
-            </a:endParaRPr>
+          </a:p>
+          <a:p>
+            <a:r>
+              <a:rPr lang="fr-FR" sz="2400" dirty="0" smtClean="0">
+                <a:solidFill>
+                  <a:srgbClr val="E8750C"/>
+                </a:solidFill>
+              </a:rPr>
+              <a:t>Nombreuses variations</a:t>
+            </a:r>
           </a:p>
         </p:txBody>
       </p:sp>
@@ -8121,7 +8297,7 @@
           <a:p>
             <a:fld id="{30547005-2CCE-4AAF-810C-C33FB4661996}" type="datetime1">
               <a:rPr lang="fr-FR" smtClean="0"/>
-              <a:t>18/12/2017</a:t>
+              <a:t>30/01/2018</a:t>
             </a:fld>
             <a:endParaRPr lang="fr-FR"/>
           </a:p>
@@ -8173,7 +8349,7 @@
         </p:blipFill>
         <p:spPr bwMode="auto">
           <a:xfrm>
-            <a:off x="3491880" y="3573016"/>
+            <a:off x="3522531" y="2708920"/>
             <a:ext cx="5772150" cy="2560638"/>
           </a:xfrm>
           <a:prstGeom prst="rect">
@@ -8298,162 +8474,152 @@
               </a:rPr>
               <a:t>GRU</a:t>
             </a:r>
+          </a:p>
+          <a:p>
+            <a:pPr lvl="1"/>
+            <a:r>
+              <a:rPr lang="fr-FR" sz="2400" dirty="0" smtClean="0">
+                <a:solidFill>
+                  <a:srgbClr val="E8750C"/>
+                </a:solidFill>
+              </a:rPr>
+              <a:t>2014</a:t>
+            </a:r>
+          </a:p>
+          <a:p>
+            <a:pPr lvl="1"/>
+            <a:r>
+              <a:rPr lang="fr-FR" sz="2400" dirty="0">
+                <a:solidFill>
+                  <a:srgbClr val="E8750C"/>
+                </a:solidFill>
+              </a:rPr>
+              <a:t>Plus rapide que LSTM</a:t>
+            </a:r>
+          </a:p>
+          <a:p>
+            <a:pPr lvl="1"/>
+            <a:r>
+              <a:rPr lang="fr-FR" sz="2400" dirty="0">
+                <a:solidFill>
+                  <a:srgbClr val="E8750C"/>
+                </a:solidFill>
+              </a:rPr>
+              <a:t>Même </a:t>
+            </a:r>
+            <a:r>
+              <a:rPr lang="fr-FR" sz="2400" dirty="0" smtClean="0">
+                <a:solidFill>
+                  <a:srgbClr val="E8750C"/>
+                </a:solidFill>
+              </a:rPr>
+              <a:t>performances</a:t>
+            </a:r>
+          </a:p>
+          <a:p>
+            <a:pPr lvl="1"/>
+            <a:r>
+              <a:rPr lang="fr-FR" sz="2400" dirty="0" smtClean="0">
+                <a:solidFill>
+                  <a:srgbClr val="E8750C"/>
+                </a:solidFill>
+              </a:rPr>
+              <a:t>Basé sur LSTM</a:t>
+            </a:r>
+          </a:p>
+          <a:p>
+            <a:pPr lvl="2"/>
+            <a:r>
+              <a:rPr lang="fr-FR" sz="2000" dirty="0" smtClean="0">
+                <a:solidFill>
+                  <a:srgbClr val="E8750C"/>
+                </a:solidFill>
+              </a:rPr>
+              <a:t>1 état (</a:t>
+            </a:r>
+            <a:r>
+              <a:rPr lang="fr-FR" sz="2000" dirty="0" err="1" smtClean="0">
+                <a:solidFill>
+                  <a:srgbClr val="E8750C"/>
+                </a:solidFill>
+              </a:rPr>
+              <a:t>Hidden</a:t>
+            </a:r>
+            <a:r>
+              <a:rPr lang="fr-FR" sz="2000" dirty="0" smtClean="0">
+                <a:solidFill>
+                  <a:srgbClr val="E8750C"/>
+                </a:solidFill>
+              </a:rPr>
+              <a:t> State)</a:t>
+            </a:r>
+          </a:p>
+          <a:p>
+            <a:pPr lvl="2"/>
+            <a:r>
+              <a:rPr lang="fr-FR" sz="2000" dirty="0" smtClean="0">
+                <a:solidFill>
+                  <a:srgbClr val="E8750C"/>
+                </a:solidFill>
+              </a:rPr>
+              <a:t>2 portes</a:t>
+            </a:r>
+          </a:p>
+          <a:p>
+            <a:pPr lvl="3"/>
+            <a:r>
+              <a:rPr lang="fr-FR" sz="1800" dirty="0" smtClean="0">
+                <a:solidFill>
+                  <a:srgbClr val="E8750C"/>
+                </a:solidFill>
+              </a:rPr>
+              <a:t>Update </a:t>
+            </a:r>
+            <a:r>
+              <a:rPr lang="fr-FR" sz="1800" dirty="0" err="1" smtClean="0">
+                <a:solidFill>
+                  <a:srgbClr val="E8750C"/>
+                </a:solidFill>
+              </a:rPr>
+              <a:t>Gate</a:t>
+            </a:r>
+            <a:endParaRPr lang="fr-FR" sz="1800" dirty="0" smtClean="0">
+              <a:solidFill>
+                <a:srgbClr val="E8750C"/>
+              </a:solidFill>
+            </a:endParaRPr>
+          </a:p>
+          <a:p>
+            <a:pPr lvl="3"/>
+            <a:r>
+              <a:rPr lang="fr-FR" sz="1800" dirty="0" smtClean="0">
+                <a:solidFill>
+                  <a:srgbClr val="E8750C"/>
+                </a:solidFill>
+              </a:rPr>
+              <a:t>Reset </a:t>
+            </a:r>
+            <a:r>
+              <a:rPr lang="fr-FR" sz="1800" dirty="0" err="1" smtClean="0">
+                <a:solidFill>
+                  <a:srgbClr val="E8750C"/>
+                </a:solidFill>
+              </a:rPr>
+              <a:t>Gate</a:t>
+            </a:r>
+            <a:endParaRPr lang="fr-FR" sz="1800" dirty="0" smtClean="0">
+              <a:solidFill>
+                <a:srgbClr val="E8750C"/>
+              </a:solidFill>
+            </a:endParaRPr>
+          </a:p>
+          <a:p>
             <a:endParaRPr lang="fr-FR" dirty="0" smtClean="0">
               <a:solidFill>
                 <a:srgbClr val="E8750C"/>
               </a:solidFill>
             </a:endParaRPr>
           </a:p>
-          <a:p>
-            <a:pPr lvl="1"/>
-            <a:r>
-              <a:rPr lang="fr-FR" sz="2400" dirty="0" smtClean="0">
-                <a:solidFill>
-                  <a:srgbClr val="E8750C"/>
-                </a:solidFill>
-              </a:rPr>
-              <a:t>2014</a:t>
-            </a:r>
-          </a:p>
-          <a:p>
-            <a:pPr lvl="1"/>
-            <a:r>
-              <a:rPr lang="fr-FR" sz="2400" dirty="0">
-                <a:solidFill>
-                  <a:srgbClr val="E8750C"/>
-                </a:solidFill>
-              </a:rPr>
-              <a:t>Plus rapide que LSTM</a:t>
-            </a:r>
-          </a:p>
-          <a:p>
-            <a:pPr lvl="1"/>
-            <a:r>
-              <a:rPr lang="fr-FR" sz="2400" dirty="0">
-                <a:solidFill>
-                  <a:srgbClr val="E8750C"/>
-                </a:solidFill>
-              </a:rPr>
-              <a:t>Même </a:t>
-            </a:r>
-            <a:r>
-              <a:rPr lang="fr-FR" sz="2400" dirty="0" smtClean="0">
-                <a:solidFill>
-                  <a:srgbClr val="E8750C"/>
-                </a:solidFill>
-              </a:rPr>
-              <a:t>performances</a:t>
-            </a:r>
-            <a:endParaRPr lang="fr-FR" sz="2400" dirty="0" smtClean="0">
-              <a:solidFill>
-                <a:srgbClr val="E8750C"/>
-              </a:solidFill>
-            </a:endParaRPr>
-          </a:p>
-          <a:p>
-            <a:pPr lvl="1"/>
-            <a:r>
-              <a:rPr lang="fr-FR" sz="2400" dirty="0" smtClean="0">
-                <a:solidFill>
-                  <a:srgbClr val="E8750C"/>
-                </a:solidFill>
-              </a:rPr>
-              <a:t>Basé sur LSTM</a:t>
-            </a:r>
-          </a:p>
-          <a:p>
-            <a:pPr lvl="2"/>
-            <a:r>
-              <a:rPr lang="fr-FR" sz="2000" dirty="0" smtClean="0">
-                <a:solidFill>
-                  <a:srgbClr val="E8750C"/>
-                </a:solidFill>
-              </a:rPr>
-              <a:t>1 état (</a:t>
-            </a:r>
-            <a:r>
-              <a:rPr lang="fr-FR" sz="2000" dirty="0" err="1" smtClean="0">
-                <a:solidFill>
-                  <a:srgbClr val="E8750C"/>
-                </a:solidFill>
-              </a:rPr>
-              <a:t>Hidden</a:t>
-            </a:r>
-            <a:r>
-              <a:rPr lang="fr-FR" sz="2000" dirty="0" smtClean="0">
-                <a:solidFill>
-                  <a:srgbClr val="E8750C"/>
-                </a:solidFill>
-              </a:rPr>
-              <a:t> State)</a:t>
-            </a:r>
-          </a:p>
-          <a:p>
-            <a:pPr lvl="2"/>
-            <a:r>
-              <a:rPr lang="fr-FR" sz="2000" dirty="0" smtClean="0">
-                <a:solidFill>
-                  <a:srgbClr val="E8750C"/>
-                </a:solidFill>
-              </a:rPr>
-              <a:t>2 portes</a:t>
-            </a:r>
-          </a:p>
-          <a:p>
-            <a:pPr lvl="3"/>
-            <a:r>
-              <a:rPr lang="fr-FR" sz="1800" dirty="0" smtClean="0">
-                <a:solidFill>
-                  <a:srgbClr val="E8750C"/>
-                </a:solidFill>
-              </a:rPr>
-              <a:t>Update </a:t>
-            </a:r>
-            <a:r>
-              <a:rPr lang="fr-FR" sz="1800" dirty="0" err="1" smtClean="0">
-                <a:solidFill>
-                  <a:srgbClr val="E8750C"/>
-                </a:solidFill>
-              </a:rPr>
-              <a:t>Gate</a:t>
-            </a:r>
-            <a:endParaRPr lang="fr-FR" sz="1800" dirty="0" smtClean="0">
-              <a:solidFill>
-                <a:srgbClr val="E8750C"/>
-              </a:solidFill>
-            </a:endParaRPr>
-          </a:p>
-          <a:p>
-            <a:pPr lvl="3"/>
-            <a:r>
-              <a:rPr lang="fr-FR" sz="1800" dirty="0" smtClean="0">
-                <a:solidFill>
-                  <a:srgbClr val="E8750C"/>
-                </a:solidFill>
-              </a:rPr>
-              <a:t>Reset </a:t>
-            </a:r>
-            <a:r>
-              <a:rPr lang="fr-FR" sz="1800" dirty="0" err="1" smtClean="0">
-                <a:solidFill>
-                  <a:srgbClr val="E8750C"/>
-                </a:solidFill>
-              </a:rPr>
-              <a:t>Gate</a:t>
-            </a:r>
-            <a:endParaRPr lang="fr-FR" sz="1800" dirty="0" smtClean="0">
-              <a:solidFill>
-                <a:srgbClr val="E8750C"/>
-              </a:solidFill>
-            </a:endParaRPr>
-          </a:p>
-          <a:p>
-            <a:endParaRPr lang="fr-FR" dirty="0" smtClean="0">
-              <a:solidFill>
-                <a:srgbClr val="E8750C"/>
-              </a:solidFill>
-            </a:endParaRPr>
-          </a:p>
         </p:txBody>
       </p:sp>
       <p:sp>
@@ -8473,7 +8639,7 @@
           <a:p>
             <a:fld id="{30547005-2CCE-4AAF-810C-C33FB4661996}" type="datetime1">
               <a:rPr lang="fr-FR" smtClean="0"/>
-              <a:t>18/12/2017</a:t>
+              <a:t>30/01/2018</a:t>
             </a:fld>
             <a:endParaRPr lang="fr-FR"/>
           </a:p>
@@ -8650,94 +8816,101 @@
               </a:rPr>
               <a:t>QRNN</a:t>
             </a:r>
+          </a:p>
+          <a:p>
+            <a:pPr lvl="1"/>
+            <a:r>
+              <a:rPr lang="fr-FR" sz="2400" dirty="0">
+                <a:solidFill>
+                  <a:srgbClr val="E8750C"/>
+                </a:solidFill>
+              </a:rPr>
+              <a:t>2016/2017 (</a:t>
+            </a:r>
+            <a:r>
+              <a:rPr lang="fr-FR" sz="2400" dirty="0">
+                <a:solidFill>
+                  <a:srgbClr val="E8750C"/>
+                </a:solidFill>
+                <a:hlinkClick r:id="rId2"/>
+              </a:rPr>
+              <a:t>https://arxiv.org/abs/1611.01576</a:t>
+            </a:r>
+            <a:r>
+              <a:rPr lang="fr-FR" sz="2400" dirty="0">
+                <a:solidFill>
+                  <a:srgbClr val="E8750C"/>
+                </a:solidFill>
+              </a:rPr>
+              <a:t>)</a:t>
+            </a:r>
+            <a:endParaRPr lang="fr-FR" sz="2400" dirty="0" smtClean="0">
+              <a:solidFill>
+                <a:srgbClr val="E8750C"/>
+              </a:solidFill>
+            </a:endParaRPr>
+          </a:p>
+          <a:p>
+            <a:pPr lvl="1"/>
+            <a:r>
+              <a:rPr lang="fr-FR" sz="2400" dirty="0">
+                <a:solidFill>
+                  <a:srgbClr val="E8750C"/>
+                </a:solidFill>
+              </a:rPr>
+              <a:t>Nouvelle architecture (Parallélisme des calculs</a:t>
+            </a:r>
+            <a:r>
+              <a:rPr lang="fr-FR" sz="2400" dirty="0" smtClean="0">
+                <a:solidFill>
+                  <a:srgbClr val="E8750C"/>
+                </a:solidFill>
+              </a:rPr>
+              <a:t>)</a:t>
+            </a:r>
+          </a:p>
+          <a:p>
+            <a:pPr lvl="1"/>
+            <a:r>
+              <a:rPr lang="fr-FR" sz="2400" dirty="0">
+                <a:solidFill>
+                  <a:srgbClr val="E8750C"/>
+                </a:solidFill>
+              </a:rPr>
+              <a:t>Plus rapide que </a:t>
+            </a:r>
+            <a:r>
+              <a:rPr lang="fr-FR" sz="2400" dirty="0" smtClean="0">
+                <a:solidFill>
+                  <a:srgbClr val="E8750C"/>
+                </a:solidFill>
+              </a:rPr>
+              <a:t>LSTM/GRU</a:t>
+            </a:r>
+            <a:endParaRPr lang="fr-FR" sz="2400" dirty="0">
+              <a:solidFill>
+                <a:srgbClr val="E8750C"/>
+              </a:solidFill>
+            </a:endParaRPr>
+          </a:p>
+          <a:p>
+            <a:pPr lvl="1"/>
+            <a:r>
+              <a:rPr lang="fr-FR" sz="2400" dirty="0" smtClean="0">
+                <a:solidFill>
+                  <a:srgbClr val="E8750C"/>
+                </a:solidFill>
+              </a:rPr>
+              <a:t>Performances encore basses</a:t>
+            </a:r>
+          </a:p>
+          <a:p>
             <a:endParaRPr lang="fr-FR" dirty="0" smtClean="0">
               <a:solidFill>
                 <a:srgbClr val="E8750C"/>
               </a:solidFill>
             </a:endParaRPr>
           </a:p>
-          <a:p>
-            <a:pPr lvl="1"/>
-            <a:r>
-              <a:rPr lang="fr-FR" sz="2400" dirty="0" smtClean="0">
-                <a:solidFill>
-                  <a:srgbClr val="E8750C"/>
-                </a:solidFill>
-              </a:rPr>
-              <a:t>2016/2017</a:t>
-            </a:r>
-          </a:p>
-          <a:p>
-            <a:pPr lvl="1"/>
-            <a:r>
-              <a:rPr lang="fr-FR" sz="2400" dirty="0">
-                <a:solidFill>
-                  <a:srgbClr val="E8750C"/>
-                </a:solidFill>
-              </a:rPr>
-              <a:t>Nouvelle architecture (Parallélisme des calculs</a:t>
-            </a:r>
-            <a:r>
-              <a:rPr lang="fr-FR" sz="2400" dirty="0" smtClean="0">
-                <a:solidFill>
-                  <a:srgbClr val="E8750C"/>
-                </a:solidFill>
-              </a:rPr>
-              <a:t>)</a:t>
-            </a:r>
-            <a:endParaRPr lang="fr-FR" sz="2400" dirty="0" smtClean="0">
-              <a:solidFill>
-                <a:srgbClr val="E8750C"/>
-              </a:solidFill>
-            </a:endParaRPr>
-          </a:p>
-          <a:p>
-            <a:pPr lvl="1"/>
-            <a:r>
-              <a:rPr lang="fr-FR" sz="2400" dirty="0">
-                <a:solidFill>
-                  <a:srgbClr val="E8750C"/>
-                </a:solidFill>
-              </a:rPr>
-              <a:t>Plus rapide que </a:t>
-            </a:r>
-            <a:r>
-              <a:rPr lang="fr-FR" sz="2400" dirty="0" smtClean="0">
-                <a:solidFill>
-                  <a:srgbClr val="E8750C"/>
-                </a:solidFill>
-              </a:rPr>
-              <a:t>LSTM/GRU</a:t>
-            </a:r>
-            <a:endParaRPr lang="fr-FR" sz="2400" dirty="0">
-              <a:solidFill>
-                <a:srgbClr val="E8750C"/>
-              </a:solidFill>
-            </a:endParaRPr>
-          </a:p>
-          <a:p>
-            <a:pPr lvl="1"/>
-            <a:r>
-              <a:rPr lang="fr-FR" sz="2400" dirty="0" smtClean="0">
-                <a:solidFill>
-                  <a:srgbClr val="E8750C"/>
-                </a:solidFill>
-              </a:rPr>
-              <a:t>Performances encore basses</a:t>
-            </a:r>
-            <a:endParaRPr lang="fr-FR" sz="2400" dirty="0" smtClean="0">
-              <a:solidFill>
-                <a:srgbClr val="E8750C"/>
-              </a:solidFill>
-            </a:endParaRPr>
-          </a:p>
-          <a:p>
-            <a:endParaRPr lang="fr-FR" dirty="0" smtClean="0">
-              <a:solidFill>
-                <a:srgbClr val="E8750C"/>
-              </a:solidFill>
-            </a:endParaRPr>
-          </a:p>
         </p:txBody>
       </p:sp>
       <p:sp>
@@ -8757,7 +8930,7 @@
           <a:p>
             <a:fld id="{30547005-2CCE-4AAF-810C-C33FB4661996}" type="datetime1">
               <a:rPr lang="fr-FR" smtClean="0"/>
-              <a:t>18/12/2017</a:t>
+              <a:t>30/01/2018</a:t>
             </a:fld>
             <a:endParaRPr lang="fr-FR"/>
           </a:p>
@@ -8795,7 +8968,7 @@
           <p:nvPr/>
         </p:nvPicPr>
         <p:blipFill>
-          <a:blip r:embed="rId2">
+          <a:blip r:embed="rId3">
             <a:clrChange>
               <a:clrFrom>
                 <a:srgbClr val="FFFFFF"/>
@@ -8954,11 +9127,6 @@
               </a:rPr>
               <a:t>QRNN</a:t>
             </a:r>
-            <a:endParaRPr lang="fr-FR" dirty="0" smtClean="0">
-              <a:solidFill>
-                <a:srgbClr val="E8750C"/>
-              </a:solidFill>
-            </a:endParaRPr>
           </a:p>
           <a:p>
             <a:pPr lvl="1"/>
@@ -8994,7 +9162,7 @@
           <a:p>
             <a:fld id="{30547005-2CCE-4AAF-810C-C33FB4661996}" type="datetime1">
               <a:rPr lang="fr-FR" smtClean="0"/>
-              <a:t>18/12/2017</a:t>
+              <a:t>30/01/2018</a:t>
             </a:fld>
             <a:endParaRPr lang="fr-FR"/>
           </a:p>
@@ -9053,7 +9221,7 @@
         </p:blipFill>
         <p:spPr bwMode="auto">
           <a:xfrm>
-            <a:off x="11097" y="2324100"/>
+            <a:off x="17657" y="2204864"/>
             <a:ext cx="4460567" cy="3600000"/>
           </a:xfrm>
           <a:prstGeom prst="rect">
@@ -9101,7 +9269,7 @@
         </p:blipFill>
         <p:spPr bwMode="auto">
           <a:xfrm>
-            <a:off x="4307852" y="2324100"/>
+            <a:off x="4331189" y="2204864"/>
             <a:ext cx="4814290" cy="3600000"/>
           </a:xfrm>
           <a:prstGeom prst="rect">
@@ -9119,6 +9287,67 @@
           </a:extLst>
         </p:spPr>
       </p:pic>
+      <p:sp>
+        <p:nvSpPr>
+          <p:cNvPr id="6" name="ZoneTexte 5"/>
+          <p:cNvSpPr txBox="1"/>
+          <p:nvPr/>
+        </p:nvSpPr>
+        <p:spPr>
+          <a:xfrm>
+            <a:off x="1331640" y="5804864"/>
+            <a:ext cx="2088232" cy="369332"/>
+          </a:xfrm>
+          <a:prstGeom prst="rect">
+            <a:avLst/>
+          </a:prstGeom>
+          <a:noFill/>
+        </p:spPr>
+        <p:txBody>
+          <a:bodyPr wrap="square" rtlCol="0">
+            <a:spAutoFit/>
+          </a:bodyPr>
+          <a:lstStyle/>
+          <a:p>
+            <a:r>
+              <a:rPr lang="fr-FR" dirty="0" smtClean="0"/>
+              <a:t>SRNN/LSTM/GRU</a:t>
+            </a:r>
+            <a:endParaRPr lang="fr-FR" dirty="0"/>
+          </a:p>
+        </p:txBody>
+      </p:sp>
+      <p:sp>
+        <p:nvSpPr>
+          <p:cNvPr id="9" name="ZoneTexte 8"/>
+          <p:cNvSpPr txBox="1"/>
+          <p:nvPr/>
+        </p:nvSpPr>
+        <p:spPr>
+          <a:xfrm>
+            <a:off x="5292080" y="5804864"/>
+            <a:ext cx="2088232" cy="369332"/>
+          </a:xfrm>
+          <a:prstGeom prst="rect">
+            <a:avLst/>
+          </a:prstGeom>
+          <a:noFill/>
+        </p:spPr>
+        <p:txBody>
+          <a:bodyPr wrap="square" rtlCol="0">
+            <a:spAutoFit/>
+          </a:bodyPr>
+          <a:lstStyle/>
+          <a:p>
+            <a:pPr algn="ctr"/>
+            <a:r>
+              <a:rPr lang="fr-FR" dirty="0" smtClean="0"/>
+              <a:t>QRNN</a:t>
+            </a:r>
+            <a:endParaRPr lang="fr-FR" dirty="0"/>
+          </a:p>
+        </p:txBody>
+      </p:sp>
     </p:spTree>
     <p:extLst>
       <p:ext uri="{BB962C8B-B14F-4D97-AF65-F5344CB8AC3E}">

</xml_diff>